<commit_message>
FIX: error in bitbucket conditions
</commit_message>
<xml_diff>
--- a/powerpoint/4 Social coding.pptx
+++ b/powerpoint/4 Social coding.pptx
@@ -16470,7 +16470,27 @@
             </a:r>
             <a:r>
               <a:rPr lang="en-US" dirty="0" smtClean="0"/>
-              <a:t>: Free for projects with up to 5 users but private repos are free. Works with Mercurial as well as </a:t>
+              <a:t>: Free for projects with up to 5 users but private repos are </a:t>
+            </a:r>
+            <a:r>
+              <a:rPr lang="en-US" dirty="0" smtClean="0"/>
+              <a:t>free (</a:t>
+            </a:r>
+            <a:r>
+              <a:rPr lang="en-US" dirty="0" smtClean="0"/>
+              <a:t>unlimited for </a:t>
+            </a:r>
+            <a:r>
+              <a:rPr lang="en-US" smtClean="0"/>
+              <a:t>academic users)</a:t>
+            </a:r>
+            <a:r>
+              <a:rPr lang="en-US" smtClean="0"/>
+              <a:t>. </a:t>
+            </a:r>
+            <a:r>
+              <a:rPr lang="en-US" dirty="0" smtClean="0"/>
+              <a:t>Works with Mercurial as well as </a:t>
             </a:r>
             <a:r>
               <a:rPr lang="en-US" dirty="0" err="1" smtClean="0"/>

</xml_diff>